<commit_message>
Added all slides and materials
</commit_message>
<xml_diff>
--- a/Documentation/SOCIAL VR.pptx
+++ b/Documentation/SOCIAL VR.pptx
@@ -113,6 +113,11 @@
       </a:defRPr>
     </a:lvl9pPr>
   </p:defaultTextStyle>
+  <p:extLst>
+    <p:ext uri="{EFAFB233-063F-42B5-8137-9DF3F51BA10A}">
+      <p15:sldGuideLst xmlns:p15="http://schemas.microsoft.com/office/powerpoint/2012/main"/>
+    </p:ext>
+  </p:extLst>
 </p:presentation>
 </file>
 
@@ -6149,19 +6154,19 @@
         </p:nvSpPr>
         <p:spPr>
           <a:xfrm>
-            <a:off x="1371600" y="4323845"/>
-            <a:ext cx="7233684" cy="545867"/>
-          </a:xfrm>
-        </p:spPr>
-        <p:txBody>
-          <a:bodyPr/>
-          <a:lstStyle/>
-          <a:p>
-            <a:r>
-              <a:rPr lang="en-AU" sz="2000" dirty="0" smtClean="0"/>
+            <a:off x="1371600" y="4323844"/>
+            <a:ext cx="9870558" cy="1049141"/>
+          </a:xfrm>
+        </p:spPr>
+        <p:txBody>
+          <a:bodyPr/>
+          <a:lstStyle/>
+          <a:p>
+            <a:r>
+              <a:rPr lang="en-AU" sz="3200" dirty="0" smtClean="0"/>
               <a:t>Click VR headset button to move through the gallery</a:t>
             </a:r>
-            <a:endParaRPr lang="en-US" sz="2000" dirty="0"/>
+            <a:endParaRPr lang="en-US" sz="3200" dirty="0"/>
           </a:p>
         </p:txBody>
       </p:sp>
@@ -6257,16 +6262,21 @@
             <p:ph type="ftr" sz="quarter" idx="11"/>
           </p:nvPr>
         </p:nvSpPr>
-        <p:spPr/>
-        <p:txBody>
-          <a:bodyPr/>
-          <a:lstStyle/>
-          <a:p>
-            <a:r>
-              <a:rPr lang="en-AU" sz="2000" dirty="0" smtClean="0"/>
+        <p:spPr>
+          <a:xfrm>
+            <a:off x="132908" y="5483975"/>
+            <a:ext cx="5658293" cy="942754"/>
+          </a:xfrm>
+        </p:spPr>
+        <p:txBody>
+          <a:bodyPr/>
+          <a:lstStyle/>
+          <a:p>
+            <a:r>
+              <a:rPr lang="en-AU" sz="3200" dirty="0" smtClean="0"/>
               <a:t>Click VR headset button to move through the gallery</a:t>
             </a:r>
-            <a:endParaRPr lang="en-US" sz="2000" dirty="0"/>
+            <a:endParaRPr lang="en-US" sz="3200" dirty="0"/>
           </a:p>
         </p:txBody>
       </p:sp>
@@ -6333,16 +6343,21 @@
             <p:ph type="ftr" sz="quarter" idx="11"/>
           </p:nvPr>
         </p:nvSpPr>
-        <p:spPr/>
-        <p:txBody>
-          <a:bodyPr/>
-          <a:lstStyle/>
-          <a:p>
-            <a:r>
-              <a:rPr lang="en-AU" sz="2000" dirty="0" smtClean="0"/>
+        <p:spPr>
+          <a:xfrm>
+            <a:off x="487325" y="6294474"/>
+            <a:ext cx="11414051" cy="425413"/>
+          </a:xfrm>
+        </p:spPr>
+        <p:txBody>
+          <a:bodyPr/>
+          <a:lstStyle/>
+          <a:p>
+            <a:r>
+              <a:rPr lang="en-AU" sz="3200" dirty="0" smtClean="0"/>
               <a:t>Click VR headset button to move through the gallery</a:t>
             </a:r>
-            <a:endParaRPr lang="en-US" sz="2000" dirty="0"/>
+            <a:endParaRPr lang="en-US" sz="3200" dirty="0"/>
           </a:p>
         </p:txBody>
       </p:sp>

</xml_diff>

<commit_message>
Solved massive raycast issue with video play and pause!
</commit_message>
<xml_diff>
--- a/Documentation/SOCIAL VR.pptx
+++ b/Documentation/SOCIAL VR.pptx
@@ -6252,34 +6252,6 @@
           </a:xfrm>
         </p:spPr>
       </p:pic>
-      <p:sp>
-        <p:nvSpPr>
-          <p:cNvPr id="4" name="Footer Placeholder 3"/>
-          <p:cNvSpPr>
-            <a:spLocks noGrp="1"/>
-          </p:cNvSpPr>
-          <p:nvPr>
-            <p:ph type="ftr" sz="quarter" idx="11"/>
-          </p:nvPr>
-        </p:nvSpPr>
-        <p:spPr>
-          <a:xfrm>
-            <a:off x="132908" y="5483975"/>
-            <a:ext cx="5658293" cy="942754"/>
-          </a:xfrm>
-        </p:spPr>
-        <p:txBody>
-          <a:bodyPr/>
-          <a:lstStyle/>
-          <a:p>
-            <a:r>
-              <a:rPr lang="en-AU" sz="3200" dirty="0" smtClean="0"/>
-              <a:t>Click VR headset button to move through the gallery</a:t>
-            </a:r>
-            <a:endParaRPr lang="en-US" sz="3200" dirty="0"/>
-          </a:p>
-        </p:txBody>
-      </p:sp>
     </p:spTree>
     <p:extLst>
       <p:ext uri="{BB962C8B-B14F-4D97-AF65-F5344CB8AC3E}">
@@ -6330,34 +6302,6 @@
               <a:t>SOCIAL VR Enhances the EXPERIENCE</a:t>
             </a:r>
             <a:endParaRPr lang="en-AU" dirty="0"/>
-          </a:p>
-        </p:txBody>
-      </p:sp>
-      <p:sp>
-        <p:nvSpPr>
-          <p:cNvPr id="4" name="Footer Placeholder 3"/>
-          <p:cNvSpPr>
-            <a:spLocks noGrp="1"/>
-          </p:cNvSpPr>
-          <p:nvPr>
-            <p:ph type="ftr" sz="quarter" idx="11"/>
-          </p:nvPr>
-        </p:nvSpPr>
-        <p:spPr>
-          <a:xfrm>
-            <a:off x="487325" y="6294474"/>
-            <a:ext cx="11414051" cy="425413"/>
-          </a:xfrm>
-        </p:spPr>
-        <p:txBody>
-          <a:bodyPr/>
-          <a:lstStyle/>
-          <a:p>
-            <a:r>
-              <a:rPr lang="en-AU" sz="3200" dirty="0" smtClean="0"/>
-              <a:t>Click VR headset button to move through the gallery</a:t>
-            </a:r>
-            <a:endParaRPr lang="en-US" sz="3200" dirty="0"/>
           </a:p>
         </p:txBody>
       </p:sp>
@@ -6472,34 +6416,6 @@
           </a:p>
         </p:txBody>
       </p:sp>
-      <p:sp>
-        <p:nvSpPr>
-          <p:cNvPr id="4" name="Footer Placeholder 3"/>
-          <p:cNvSpPr>
-            <a:spLocks noGrp="1"/>
-          </p:cNvSpPr>
-          <p:nvPr>
-            <p:ph type="ftr" sz="quarter" idx="11"/>
-          </p:nvPr>
-        </p:nvSpPr>
-        <p:spPr>
-          <a:xfrm>
-            <a:off x="1024467" y="4415367"/>
-            <a:ext cx="6991492" cy="364065"/>
-          </a:xfrm>
-        </p:spPr>
-        <p:txBody>
-          <a:bodyPr/>
-          <a:lstStyle/>
-          <a:p>
-            <a:r>
-              <a:rPr lang="en-AU" sz="2000" dirty="0" smtClean="0"/>
-              <a:t>Click VR headset button to move through the gallery</a:t>
-            </a:r>
-            <a:endParaRPr lang="en-US" sz="2000" dirty="0"/>
-          </a:p>
-        </p:txBody>
-      </p:sp>
     </p:spTree>
     <p:extLst>
       <p:ext uri="{BB962C8B-B14F-4D97-AF65-F5344CB8AC3E}">
@@ -6580,34 +6496,6 @@
           </a:p>
         </p:txBody>
       </p:sp>
-      <p:sp>
-        <p:nvSpPr>
-          <p:cNvPr id="4" name="Footer Placeholder 3"/>
-          <p:cNvSpPr>
-            <a:spLocks noGrp="1"/>
-          </p:cNvSpPr>
-          <p:nvPr>
-            <p:ph type="ftr" sz="quarter" idx="11"/>
-          </p:nvPr>
-        </p:nvSpPr>
-        <p:spPr>
-          <a:xfrm>
-            <a:off x="1024467" y="4415367"/>
-            <a:ext cx="6991492" cy="364065"/>
-          </a:xfrm>
-        </p:spPr>
-        <p:txBody>
-          <a:bodyPr/>
-          <a:lstStyle/>
-          <a:p>
-            <a:r>
-              <a:rPr lang="en-AU" sz="2000" dirty="0" smtClean="0"/>
-              <a:t>Click VR headset button to move through the gallery</a:t>
-            </a:r>
-            <a:endParaRPr lang="en-US" sz="2000" dirty="0"/>
-          </a:p>
-        </p:txBody>
-      </p:sp>
     </p:spTree>
     <p:extLst>
       <p:ext uri="{BB962C8B-B14F-4D97-AF65-F5344CB8AC3E}">
@@ -6684,34 +6572,6 @@
           </a:p>
         </p:txBody>
       </p:sp>
-      <p:sp>
-        <p:nvSpPr>
-          <p:cNvPr id="4" name="Footer Placeholder 3"/>
-          <p:cNvSpPr>
-            <a:spLocks noGrp="1"/>
-          </p:cNvSpPr>
-          <p:nvPr>
-            <p:ph type="ftr" sz="quarter" idx="11"/>
-          </p:nvPr>
-        </p:nvSpPr>
-        <p:spPr>
-          <a:xfrm>
-            <a:off x="1024467" y="4415367"/>
-            <a:ext cx="6991492" cy="364065"/>
-          </a:xfrm>
-        </p:spPr>
-        <p:txBody>
-          <a:bodyPr/>
-          <a:lstStyle/>
-          <a:p>
-            <a:r>
-              <a:rPr lang="en-AU" sz="2000" dirty="0" smtClean="0"/>
-              <a:t>Click VR headset button to move through the gallery</a:t>
-            </a:r>
-            <a:endParaRPr lang="en-US" sz="2000" dirty="0"/>
-          </a:p>
-        </p:txBody>
-      </p:sp>
     </p:spTree>
     <p:extLst>
       <p:ext uri="{BB962C8B-B14F-4D97-AF65-F5344CB8AC3E}">
@@ -6767,25 +6627,6 @@
       </p:sp>
       <p:sp>
         <p:nvSpPr>
-          <p:cNvPr id="3" name="Text Placeholder 2"/>
-          <p:cNvSpPr>
-            <a:spLocks noGrp="1"/>
-          </p:cNvSpPr>
-          <p:nvPr>
-            <p:ph type="body" idx="1"/>
-          </p:nvPr>
-        </p:nvSpPr>
-        <p:spPr/>
-        <p:txBody>
-          <a:bodyPr/>
-          <a:lstStyle/>
-          <a:p>
-            <a:endParaRPr lang="en-AU" sz="3200" dirty="0"/>
-          </a:p>
-        </p:txBody>
-      </p:sp>
-      <p:sp>
-        <p:nvSpPr>
           <p:cNvPr id="4" name="Footer Placeholder 3"/>
           <p:cNvSpPr>
             <a:spLocks noGrp="1"/>
@@ -6796,19 +6637,19 @@
         </p:nvSpPr>
         <p:spPr>
           <a:xfrm>
-            <a:off x="1024467" y="4415367"/>
-            <a:ext cx="6991492" cy="364065"/>
-          </a:xfrm>
-        </p:spPr>
-        <p:txBody>
-          <a:bodyPr/>
-          <a:lstStyle/>
-          <a:p>
-            <a:r>
-              <a:rPr lang="en-AU" sz="2000" dirty="0" smtClean="0"/>
+            <a:off x="967759" y="3555468"/>
+            <a:ext cx="10706789" cy="1184447"/>
+          </a:xfrm>
+        </p:spPr>
+        <p:txBody>
+          <a:bodyPr/>
+          <a:lstStyle/>
+          <a:p>
+            <a:r>
+              <a:rPr lang="en-AU" sz="3200" dirty="0" smtClean="0"/>
               <a:t>Click VR headset button to move through the gallery</a:t>
             </a:r>
-            <a:endParaRPr lang="en-US" sz="2000" dirty="0"/>
+            <a:endParaRPr lang="en-US" sz="3200" dirty="0"/>
           </a:p>
         </p:txBody>
       </p:sp>

</xml_diff>